<commit_message>
Added trained classifier for answer type
</commit_message>
<xml_diff>
--- a/disneyqanda.pptx
+++ b/disneyqanda.pptx
@@ -9,8 +9,10 @@
     <p:sldId id="262" r:id="rId3"/>
     <p:sldId id="294" r:id="rId4"/>
     <p:sldId id="295" r:id="rId5"/>
-    <p:sldId id="296" r:id="rId6"/>
-    <p:sldId id="293" r:id="rId7"/>
+    <p:sldId id="297" r:id="rId6"/>
+    <p:sldId id="298" r:id="rId7"/>
+    <p:sldId id="296" r:id="rId8"/>
+    <p:sldId id="293" r:id="rId9"/>
   </p:sldIdLst>
   <p:sldSz cx="12192000" cy="6858000"/>
   <p:notesSz cx="6858000" cy="9144000"/>
@@ -256,7 +258,7 @@
           <a:p>
             <a:fld id="{7601110F-1B76-8242-AE2F-5F83B5239CF8}" type="datetimeFigureOut">
               <a:rPr lang="en-US" smtClean="0"/>
-              <a:t>11/28/2020</a:t>
+              <a:t>11/29/2020</a:t>
             </a:fld>
             <a:endParaRPr lang="en-US"/>
           </a:p>
@@ -426,7 +428,7 @@
           <a:p>
             <a:fld id="{7601110F-1B76-8242-AE2F-5F83B5239CF8}" type="datetimeFigureOut">
               <a:rPr lang="en-US" smtClean="0"/>
-              <a:t>11/28/2020</a:t>
+              <a:t>11/29/2020</a:t>
             </a:fld>
             <a:endParaRPr lang="en-US"/>
           </a:p>
@@ -606,7 +608,7 @@
           <a:p>
             <a:fld id="{7601110F-1B76-8242-AE2F-5F83B5239CF8}" type="datetimeFigureOut">
               <a:rPr lang="en-US" smtClean="0"/>
-              <a:t>11/28/2020</a:t>
+              <a:t>11/29/2020</a:t>
             </a:fld>
             <a:endParaRPr lang="en-US"/>
           </a:p>
@@ -776,7 +778,7 @@
           <a:p>
             <a:fld id="{7601110F-1B76-8242-AE2F-5F83B5239CF8}" type="datetimeFigureOut">
               <a:rPr lang="en-US" smtClean="0"/>
-              <a:t>11/28/2020</a:t>
+              <a:t>11/29/2020</a:t>
             </a:fld>
             <a:endParaRPr lang="en-US"/>
           </a:p>
@@ -1020,7 +1022,7 @@
           <a:p>
             <a:fld id="{7601110F-1B76-8242-AE2F-5F83B5239CF8}" type="datetimeFigureOut">
               <a:rPr lang="en-US" smtClean="0"/>
-              <a:t>11/28/2020</a:t>
+              <a:t>11/29/2020</a:t>
             </a:fld>
             <a:endParaRPr lang="en-US"/>
           </a:p>
@@ -1252,7 +1254,7 @@
           <a:p>
             <a:fld id="{7601110F-1B76-8242-AE2F-5F83B5239CF8}" type="datetimeFigureOut">
               <a:rPr lang="en-US" smtClean="0"/>
-              <a:t>11/28/2020</a:t>
+              <a:t>11/29/2020</a:t>
             </a:fld>
             <a:endParaRPr lang="en-US"/>
           </a:p>
@@ -1619,7 +1621,7 @@
           <a:p>
             <a:fld id="{7601110F-1B76-8242-AE2F-5F83B5239CF8}" type="datetimeFigureOut">
               <a:rPr lang="en-US" smtClean="0"/>
-              <a:t>11/28/2020</a:t>
+              <a:t>11/29/2020</a:t>
             </a:fld>
             <a:endParaRPr lang="en-US"/>
           </a:p>
@@ -1737,7 +1739,7 @@
           <a:p>
             <a:fld id="{7601110F-1B76-8242-AE2F-5F83B5239CF8}" type="datetimeFigureOut">
               <a:rPr lang="en-US" smtClean="0"/>
-              <a:t>11/28/2020</a:t>
+              <a:t>11/29/2020</a:t>
             </a:fld>
             <a:endParaRPr lang="en-US"/>
           </a:p>
@@ -1832,7 +1834,7 @@
           <a:p>
             <a:fld id="{7601110F-1B76-8242-AE2F-5F83B5239CF8}" type="datetimeFigureOut">
               <a:rPr lang="en-US" smtClean="0"/>
-              <a:t>11/28/2020</a:t>
+              <a:t>11/29/2020</a:t>
             </a:fld>
             <a:endParaRPr lang="en-US"/>
           </a:p>
@@ -2109,7 +2111,7 @@
           <a:p>
             <a:fld id="{7601110F-1B76-8242-AE2F-5F83B5239CF8}" type="datetimeFigureOut">
               <a:rPr lang="en-US" smtClean="0"/>
-              <a:t>11/28/2020</a:t>
+              <a:t>11/29/2020</a:t>
             </a:fld>
             <a:endParaRPr lang="en-US"/>
           </a:p>
@@ -2366,7 +2368,7 @@
           <a:p>
             <a:fld id="{7601110F-1B76-8242-AE2F-5F83B5239CF8}" type="datetimeFigureOut">
               <a:rPr lang="en-US" smtClean="0"/>
-              <a:t>11/28/2020</a:t>
+              <a:t>11/29/2020</a:t>
             </a:fld>
             <a:endParaRPr lang="en-US"/>
           </a:p>
@@ -2579,7 +2581,7 @@
           <a:p>
             <a:fld id="{7601110F-1B76-8242-AE2F-5F83B5239CF8}" type="datetimeFigureOut">
               <a:rPr lang="en-US" smtClean="0"/>
-              <a:t>11/28/2020</a:t>
+              <a:t>11/29/2020</a:t>
             </a:fld>
             <a:endParaRPr lang="en-US"/>
           </a:p>
@@ -4576,8 +4578,8 @@
         </p:nvSpPr>
         <p:spPr>
           <a:xfrm>
-            <a:off x="1121088" y="2134049"/>
-            <a:ext cx="9452217" cy="461665"/>
+            <a:off x="432095" y="2177617"/>
+            <a:ext cx="1398694" cy="461665"/>
           </a:xfrm>
           <a:prstGeom prst="rect">
             <a:avLst/>
@@ -4598,7 +4600,7 @@
                   </a:schemeClr>
                 </a:solidFill>
               </a:rPr>
-              <a:t>Tokenize question</a:t>
+              <a:t>Tokenize</a:t>
             </a:r>
             <a:endParaRPr lang="en-US" sz="2400" dirty="0"/>
           </a:p>
@@ -4618,8 +4620,187 @@
         </p:nvSpPr>
         <p:spPr>
           <a:xfrm>
-            <a:off x="1121088" y="2651964"/>
-            <a:ext cx="8586438" cy="461665"/>
+            <a:off x="432095" y="3054168"/>
+            <a:ext cx="2740698" cy="461665"/>
+          </a:xfrm>
+          <a:prstGeom prst="rect">
+            <a:avLst/>
+          </a:prstGeom>
+          <a:noFill/>
+        </p:spPr>
+        <p:txBody>
+          <a:bodyPr wrap="square" rtlCol="0">
+            <a:spAutoFit/>
+          </a:bodyPr>
+          <a:lstStyle>
+            <a:defPPr>
+              <a:defRPr lang="en-US"/>
+            </a:defPPr>
+            <a:lvl1pPr>
+              <a:defRPr sz="2400">
+                <a:solidFill>
+                  <a:schemeClr val="accent5">
+                    <a:lumMod val="75000"/>
+                  </a:schemeClr>
+                </a:solidFill>
+              </a:defRPr>
+            </a:lvl1pPr>
+          </a:lstStyle>
+          <a:p>
+            <a:r>
+              <a:rPr lang="en-US" dirty="0"/>
+              <a:t>Remove </a:t>
+            </a:r>
+            <a:r>
+              <a:rPr lang="en-US" dirty="0" err="1"/>
+              <a:t>stopwords</a:t>
+            </a:r>
+            <a:endParaRPr lang="en-US" dirty="0"/>
+          </a:p>
+        </p:txBody>
+      </p:sp>
+      <p:pic>
+        <p:nvPicPr>
+          <p:cNvPr id="20" name="Picture 19">
+            <a:extLst>
+              <a:ext uri="{FF2B5EF4-FFF2-40B4-BE49-F238E27FC236}">
+                <a16:creationId xmlns:a16="http://schemas.microsoft.com/office/drawing/2014/main" id="{B5D47350-D5C7-4323-951F-3AE1A43766EE}"/>
+              </a:ext>
+            </a:extLst>
+          </p:cNvPr>
+          <p:cNvPicPr>
+            <a:picLocks noChangeAspect="1"/>
+          </p:cNvPicPr>
+          <p:nvPr/>
+        </p:nvPicPr>
+        <p:blipFill>
+          <a:blip r:embed="rId2"/>
+          <a:stretch>
+            <a:fillRect/>
+          </a:stretch>
+        </p:blipFill>
+        <p:spPr>
+          <a:xfrm>
+            <a:off x="8134350" y="693019"/>
+            <a:ext cx="4057650" cy="447675"/>
+          </a:xfrm>
+          <a:prstGeom prst="rect">
+            <a:avLst/>
+          </a:prstGeom>
+        </p:spPr>
+      </p:pic>
+      <p:sp>
+        <p:nvSpPr>
+          <p:cNvPr id="6" name="TextBox 5">
+            <a:extLst>
+              <a:ext uri="{FF2B5EF4-FFF2-40B4-BE49-F238E27FC236}">
+                <a16:creationId xmlns:a16="http://schemas.microsoft.com/office/drawing/2014/main" id="{3BED0B0D-116A-4672-89D0-88D18E56949D}"/>
+              </a:ext>
+            </a:extLst>
+          </p:cNvPr>
+          <p:cNvSpPr txBox="1"/>
+          <p:nvPr/>
+        </p:nvSpPr>
+        <p:spPr>
+          <a:xfrm>
+            <a:off x="432095" y="3943465"/>
+            <a:ext cx="5926306" cy="461665"/>
+          </a:xfrm>
+          <a:prstGeom prst="rect">
+            <a:avLst/>
+          </a:prstGeom>
+          <a:noFill/>
+        </p:spPr>
+        <p:txBody>
+          <a:bodyPr wrap="square" rtlCol="0">
+            <a:spAutoFit/>
+          </a:bodyPr>
+          <a:lstStyle>
+            <a:defPPr>
+              <a:defRPr lang="en-US"/>
+            </a:defPPr>
+            <a:lvl1pPr>
+              <a:defRPr sz="2400">
+                <a:solidFill>
+                  <a:schemeClr val="accent5">
+                    <a:lumMod val="75000"/>
+                  </a:schemeClr>
+                </a:solidFill>
+              </a:defRPr>
+            </a:lvl1pPr>
+          </a:lstStyle>
+          <a:p>
+            <a:r>
+              <a:rPr lang="en-US" dirty="0"/>
+              <a:t>POS tags</a:t>
+            </a:r>
+          </a:p>
+        </p:txBody>
+      </p:sp>
+      <p:sp>
+        <p:nvSpPr>
+          <p:cNvPr id="8" name="TextBox 7">
+            <a:extLst>
+              <a:ext uri="{FF2B5EF4-FFF2-40B4-BE49-F238E27FC236}">
+                <a16:creationId xmlns:a16="http://schemas.microsoft.com/office/drawing/2014/main" id="{C5791825-884C-43A6-9AF5-AD1D1FF29DBC}"/>
+              </a:ext>
+            </a:extLst>
+          </p:cNvPr>
+          <p:cNvSpPr txBox="1"/>
+          <p:nvPr/>
+        </p:nvSpPr>
+        <p:spPr>
+          <a:xfrm>
+            <a:off x="432095" y="5075019"/>
+            <a:ext cx="5926306" cy="461665"/>
+          </a:xfrm>
+          <a:prstGeom prst="rect">
+            <a:avLst/>
+          </a:prstGeom>
+          <a:noFill/>
+        </p:spPr>
+        <p:txBody>
+          <a:bodyPr wrap="square" rtlCol="0">
+            <a:spAutoFit/>
+          </a:bodyPr>
+          <a:lstStyle>
+            <a:defPPr>
+              <a:defRPr lang="en-US"/>
+            </a:defPPr>
+            <a:lvl1pPr>
+              <a:defRPr sz="2400">
+                <a:solidFill>
+                  <a:schemeClr val="accent5">
+                    <a:lumMod val="75000"/>
+                  </a:schemeClr>
+                </a:solidFill>
+              </a:defRPr>
+            </a:lvl1pPr>
+          </a:lstStyle>
+          <a:p>
+            <a:r>
+              <a:rPr lang="en-US" dirty="0"/>
+              <a:t>Look for Disney named entities</a:t>
+            </a:r>
+          </a:p>
+        </p:txBody>
+      </p:sp>
+      <p:sp>
+        <p:nvSpPr>
+          <p:cNvPr id="15" name="TextBox 14">
+            <a:extLst>
+              <a:ext uri="{FF2B5EF4-FFF2-40B4-BE49-F238E27FC236}">
+                <a16:creationId xmlns:a16="http://schemas.microsoft.com/office/drawing/2014/main" id="{7AC26081-C000-4315-84CA-F800F78B0ED7}"/>
+              </a:ext>
+            </a:extLst>
+          </p:cNvPr>
+          <p:cNvSpPr txBox="1"/>
+          <p:nvPr/>
+        </p:nvSpPr>
+        <p:spPr>
+          <a:xfrm>
+            <a:off x="432095" y="1301066"/>
+            <a:ext cx="1398694" cy="461665"/>
           </a:xfrm>
           <a:prstGeom prst="rect">
             <a:avLst/>
@@ -4640,52 +4821,168 @@
                   </a:schemeClr>
                 </a:solidFill>
               </a:rPr>
-              <a:t>Remove </a:t>
-            </a:r>
-            <a:r>
-              <a:rPr lang="en-US" sz="2400" dirty="0" err="1">
-                <a:solidFill>
-                  <a:schemeClr val="accent5">
-                    <a:lumMod val="75000"/>
-                  </a:schemeClr>
-                </a:solidFill>
+              <a:t>Question</a:t>
+            </a:r>
+            <a:endParaRPr lang="en-US" sz="2400" dirty="0"/>
+          </a:p>
+        </p:txBody>
+      </p:sp>
+      <p:sp>
+        <p:nvSpPr>
+          <p:cNvPr id="4" name="TextBox 3">
+            <a:extLst>
+              <a:ext uri="{FF2B5EF4-FFF2-40B4-BE49-F238E27FC236}">
+                <a16:creationId xmlns:a16="http://schemas.microsoft.com/office/drawing/2014/main" id="{471647A1-12BC-4D2D-B5A0-7ADC557EB5BC}"/>
+              </a:ext>
+            </a:extLst>
+          </p:cNvPr>
+          <p:cNvSpPr txBox="1"/>
+          <p:nvPr/>
+        </p:nvSpPr>
+        <p:spPr>
+          <a:xfrm>
+            <a:off x="905522" y="1696347"/>
+            <a:ext cx="8167456" cy="338554"/>
+          </a:xfrm>
+          <a:prstGeom prst="rect">
+            <a:avLst/>
+          </a:prstGeom>
+          <a:noFill/>
+        </p:spPr>
+        <p:txBody>
+          <a:bodyPr wrap="square" rtlCol="0">
+            <a:spAutoFit/>
+          </a:bodyPr>
+          <a:lstStyle/>
+          <a:p>
+            <a:r>
+              <a:rPr lang="en-US" sz="1600" dirty="0">
+                <a:latin typeface="Arial Nova" panose="020B0504020202020204" pitchFamily="34" charset="0"/>
               </a:rPr>
-              <a:t>stopwords</a:t>
-            </a:r>
-            <a:endParaRPr lang="en-US" sz="2400" dirty="0"/>
-          </a:p>
-        </p:txBody>
-      </p:sp>
-      <p:pic>
-        <p:nvPicPr>
-          <p:cNvPr id="20" name="Picture 19">
-            <a:extLst>
-              <a:ext uri="{FF2B5EF4-FFF2-40B4-BE49-F238E27FC236}">
-                <a16:creationId xmlns:a16="http://schemas.microsoft.com/office/drawing/2014/main" id="{B5D47350-D5C7-4323-951F-3AE1A43766EE}"/>
-              </a:ext>
-            </a:extLst>
-          </p:cNvPr>
-          <p:cNvPicPr>
-            <a:picLocks noChangeAspect="1"/>
-          </p:cNvPicPr>
-          <p:nvPr/>
-        </p:nvPicPr>
-        <p:blipFill>
-          <a:blip r:embed="rId2"/>
-          <a:stretch>
-            <a:fillRect/>
-          </a:stretch>
-        </p:blipFill>
-        <p:spPr>
-          <a:xfrm>
-            <a:off x="8134350" y="693019"/>
-            <a:ext cx="4057650" cy="447675"/>
+              <a:t>What is the height requirement for Star Wars: Rise of the Resistance?</a:t>
+            </a:r>
+          </a:p>
+        </p:txBody>
+      </p:sp>
+      <p:sp>
+        <p:nvSpPr>
+          <p:cNvPr id="16" name="TextBox 15">
+            <a:extLst>
+              <a:ext uri="{FF2B5EF4-FFF2-40B4-BE49-F238E27FC236}">
+                <a16:creationId xmlns:a16="http://schemas.microsoft.com/office/drawing/2014/main" id="{9C6AF184-B02A-4C0E-99B0-9892E2EDC048}"/>
+              </a:ext>
+            </a:extLst>
+          </p:cNvPr>
+          <p:cNvSpPr txBox="1"/>
+          <p:nvPr/>
+        </p:nvSpPr>
+        <p:spPr>
+          <a:xfrm>
+            <a:off x="905522" y="2577138"/>
+            <a:ext cx="8673484" cy="338554"/>
           </a:xfrm>
           <a:prstGeom prst="rect">
             <a:avLst/>
           </a:prstGeom>
-        </p:spPr>
-      </p:pic>
+          <a:noFill/>
+        </p:spPr>
+        <p:txBody>
+          <a:bodyPr wrap="square" rtlCol="0">
+            <a:spAutoFit/>
+          </a:bodyPr>
+          <a:lstStyle/>
+          <a:p>
+            <a:r>
+              <a:rPr lang="en-US" sz="1600" dirty="0">
+                <a:latin typeface="Arial Nova" panose="020B0504020202020204" pitchFamily="34" charset="0"/>
+              </a:rPr>
+              <a:t>['What', 'is', 'the', 'height', 'requirement', 'for', 'Star', 'Wars', ':', 'Rise', 'of', 'the', 'Resistance', '?'] </a:t>
+            </a:r>
+          </a:p>
+        </p:txBody>
+      </p:sp>
+      <p:sp>
+        <p:nvSpPr>
+          <p:cNvPr id="17" name="TextBox 16">
+            <a:extLst>
+              <a:ext uri="{FF2B5EF4-FFF2-40B4-BE49-F238E27FC236}">
+                <a16:creationId xmlns:a16="http://schemas.microsoft.com/office/drawing/2014/main" id="{CB8D8D2E-7615-4085-A0FE-5D33CCB45EA8}"/>
+              </a:ext>
+            </a:extLst>
+          </p:cNvPr>
+          <p:cNvSpPr txBox="1"/>
+          <p:nvPr/>
+        </p:nvSpPr>
+        <p:spPr>
+          <a:xfrm>
+            <a:off x="905522" y="3461841"/>
+            <a:ext cx="8673484" cy="338554"/>
+          </a:xfrm>
+          <a:prstGeom prst="rect">
+            <a:avLst/>
+          </a:prstGeom>
+          <a:noFill/>
+        </p:spPr>
+        <p:txBody>
+          <a:bodyPr wrap="square" rtlCol="0">
+            <a:spAutoFit/>
+          </a:bodyPr>
+          <a:lstStyle/>
+          <a:p>
+            <a:r>
+              <a:rPr lang="en-US" sz="1600" dirty="0">
+                <a:latin typeface="Arial Nova" panose="020B0504020202020204" pitchFamily="34" charset="0"/>
+              </a:rPr>
+              <a:t>['height', 'requirement', 'star', 'wars', ':', 'rise', 'resistance', '?']</a:t>
+            </a:r>
+          </a:p>
+        </p:txBody>
+      </p:sp>
+      <p:sp>
+        <p:nvSpPr>
+          <p:cNvPr id="18" name="TextBox 17">
+            <a:extLst>
+              <a:ext uri="{FF2B5EF4-FFF2-40B4-BE49-F238E27FC236}">
+                <a16:creationId xmlns:a16="http://schemas.microsoft.com/office/drawing/2014/main" id="{36A60B6E-161D-4B90-B6CC-192DE2A8D1A0}"/>
+              </a:ext>
+            </a:extLst>
+          </p:cNvPr>
+          <p:cNvSpPr txBox="1"/>
+          <p:nvPr/>
+        </p:nvSpPr>
+        <p:spPr>
+          <a:xfrm>
+            <a:off x="905522" y="4346544"/>
+            <a:ext cx="8673484" cy="584775"/>
+          </a:xfrm>
+          <a:prstGeom prst="rect">
+            <a:avLst/>
+          </a:prstGeom>
+          <a:noFill/>
+        </p:spPr>
+        <p:txBody>
+          <a:bodyPr wrap="square" rtlCol="0">
+            <a:spAutoFit/>
+          </a:bodyPr>
+          <a:lstStyle/>
+          <a:p>
+            <a:r>
+              <a:rPr lang="en-US" sz="1600" dirty="0">
+                <a:latin typeface="Arial Nova" panose="020B0504020202020204" pitchFamily="34" charset="0"/>
+              </a:rPr>
+              <a:t>[('height', 'ADJ'), ('requirement', 'NOUN'), ('star', 'NOUN'), ('wars', 'NOUN'), (':', '.’),</a:t>
+            </a:r>
+          </a:p>
+          <a:p>
+            <a:r>
+              <a:rPr lang="en-US" sz="1600" dirty="0">
+                <a:latin typeface="Arial Nova" panose="020B0504020202020204" pitchFamily="34" charset="0"/>
+              </a:rPr>
+              <a:t> ('rise', 'NOUN'), ('resistance', 'NOUN'), ('?', '.')] </a:t>
+            </a:r>
+          </a:p>
+        </p:txBody>
+      </p:sp>
     </p:spTree>
     <p:extLst>
       <p:ext uri="{BB962C8B-B14F-4D97-AF65-F5344CB8AC3E}">
@@ -4746,6 +5043,60 @@
                                   </p:childTnLst>
                                 </p:cTn>
                               </p:par>
+                              <p:par>
+                                <p:cTn id="7" presetID="1" presetClass="entr" presetSubtype="0" fill="hold" grpId="0" nodeType="withEffect">
+                                  <p:stCondLst>
+                                    <p:cond delay="0"/>
+                                  </p:stCondLst>
+                                  <p:childTnLst>
+                                    <p:set>
+                                      <p:cBhvr>
+                                        <p:cTn id="8" dur="1" fill="hold">
+                                          <p:stCondLst>
+                                            <p:cond delay="0"/>
+                                          </p:stCondLst>
+                                        </p:cTn>
+                                        <p:tgtEl>
+                                          <p:spTgt spid="6"/>
+                                        </p:tgtEl>
+                                        <p:attrNameLst>
+                                          <p:attrName>style.visibility</p:attrName>
+                                        </p:attrNameLst>
+                                      </p:cBhvr>
+                                      <p:to>
+                                        <p:strVal val="visible"/>
+                                      </p:to>
+                                    </p:set>
+                                  </p:childTnLst>
+                                </p:cTn>
+                              </p:par>
+                              <p:par>
+                                <p:cTn id="9" presetID="1" presetClass="entr" presetSubtype="0" fill="hold" grpId="0" nodeType="withEffect">
+                                  <p:stCondLst>
+                                    <p:cond delay="0"/>
+                                  </p:stCondLst>
+                                  <p:childTnLst>
+                                    <p:set>
+                                      <p:cBhvr>
+                                        <p:cTn id="10" dur="1" fill="hold">
+                                          <p:stCondLst>
+                                            <p:cond delay="0"/>
+                                          </p:stCondLst>
+                                        </p:cTn>
+                                        <p:tgtEl>
+                                          <p:spTgt spid="8"/>
+                                        </p:tgtEl>
+                                        <p:attrNameLst>
+                                          <p:attrName>style.visibility</p:attrName>
+                                        </p:attrNameLst>
+                                      </p:cBhvr>
+                                      <p:to>
+                                        <p:strVal val="visible"/>
+                                      </p:to>
+                                    </p:set>
+                                  </p:childTnLst>
+                                </p:cTn>
+                              </p:par>
                             </p:childTnLst>
                           </p:cTn>
                         </p:par>
@@ -4775,12 +5126,1010 @@
     </p:tnLst>
     <p:bldLst>
       <p:bldP spid="5" grpId="0"/>
+      <p:bldP spid="6" grpId="0"/>
+      <p:bldP spid="8" grpId="0"/>
     </p:bldLst>
   </p:timing>
 </p:sld>
 </file>
 
 <file path=ppt/slides/slide5.xml><?xml version="1.0" encoding="utf-8"?>
+<p:sld xmlns:a="http://schemas.openxmlformats.org/drawingml/2006/main" xmlns:r="http://schemas.openxmlformats.org/officeDocument/2006/relationships" xmlns:p="http://schemas.openxmlformats.org/presentationml/2006/main">
+  <p:cSld>
+    <p:spTree>
+      <p:nvGrpSpPr>
+        <p:cNvPr id="1" name=""/>
+        <p:cNvGrpSpPr/>
+        <p:nvPr/>
+      </p:nvGrpSpPr>
+      <p:grpSpPr>
+        <a:xfrm>
+          <a:off x="0" y="0"/>
+          <a:ext cx="0" cy="0"/>
+          <a:chOff x="0" y="0"/>
+          <a:chExt cx="0" cy="0"/>
+        </a:xfrm>
+      </p:grpSpPr>
+      <p:sp>
+        <p:nvSpPr>
+          <p:cNvPr id="13" name="Title 1">
+            <a:extLst>
+              <a:ext uri="{FF2B5EF4-FFF2-40B4-BE49-F238E27FC236}">
+                <a16:creationId xmlns:a16="http://schemas.microsoft.com/office/drawing/2014/main" id="{1127F941-043E-4D99-BA77-D0CB0DAFE611}"/>
+              </a:ext>
+            </a:extLst>
+          </p:cNvPr>
+          <p:cNvSpPr txBox="1">
+            <a:spLocks/>
+          </p:cNvSpPr>
+          <p:nvPr/>
+        </p:nvSpPr>
+        <p:spPr>
+          <a:xfrm>
+            <a:off x="0" y="1"/>
+            <a:ext cx="12192000" cy="1141581"/>
+          </a:xfrm>
+          <a:prstGeom prst="rect">
+            <a:avLst/>
+          </a:prstGeom>
+          <a:solidFill>
+            <a:schemeClr val="tx2">
+              <a:lumMod val="75000"/>
+            </a:schemeClr>
+          </a:solidFill>
+        </p:spPr>
+        <p:txBody>
+          <a:bodyPr vert="horz" lIns="91440" tIns="45720" rIns="91440" bIns="45720" rtlCol="0" anchor="ctr">
+            <a:normAutofit/>
+          </a:bodyPr>
+          <a:lstStyle>
+            <a:lvl1pPr algn="l" defTabSz="914400" rtl="0" eaLnBrk="1" latinLnBrk="0" hangingPunct="1">
+              <a:lnSpc>
+                <a:spcPct val="90000"/>
+              </a:lnSpc>
+              <a:spcBef>
+                <a:spcPct val="0"/>
+              </a:spcBef>
+              <a:buNone/>
+              <a:defRPr sz="4400" kern="1200">
+                <a:solidFill>
+                  <a:schemeClr val="tx1"/>
+                </a:solidFill>
+                <a:latin typeface="+mj-lt"/>
+                <a:ea typeface="+mj-ea"/>
+                <a:cs typeface="+mj-cs"/>
+              </a:defRPr>
+            </a:lvl1pPr>
+          </a:lstStyle>
+          <a:p>
+            <a:r>
+              <a:rPr lang="en-US" sz="5700" dirty="0">
+                <a:solidFill>
+                  <a:schemeClr val="bg1"/>
+                </a:solidFill>
+              </a:rPr>
+              <a:t>   Question Processing</a:t>
+            </a:r>
+          </a:p>
+        </p:txBody>
+      </p:sp>
+      <p:pic>
+        <p:nvPicPr>
+          <p:cNvPr id="20" name="Picture 19">
+            <a:extLst>
+              <a:ext uri="{FF2B5EF4-FFF2-40B4-BE49-F238E27FC236}">
+                <a16:creationId xmlns:a16="http://schemas.microsoft.com/office/drawing/2014/main" id="{B5D47350-D5C7-4323-951F-3AE1A43766EE}"/>
+              </a:ext>
+            </a:extLst>
+          </p:cNvPr>
+          <p:cNvPicPr>
+            <a:picLocks noChangeAspect="1"/>
+          </p:cNvPicPr>
+          <p:nvPr/>
+        </p:nvPicPr>
+        <p:blipFill>
+          <a:blip r:embed="rId2"/>
+          <a:stretch>
+            <a:fillRect/>
+          </a:stretch>
+        </p:blipFill>
+        <p:spPr>
+          <a:xfrm>
+            <a:off x="8134350" y="693019"/>
+            <a:ext cx="4057650" cy="447675"/>
+          </a:xfrm>
+          <a:prstGeom prst="rect">
+            <a:avLst/>
+          </a:prstGeom>
+        </p:spPr>
+      </p:pic>
+      <p:sp>
+        <p:nvSpPr>
+          <p:cNvPr id="7" name="TextBox 6">
+            <a:extLst>
+              <a:ext uri="{FF2B5EF4-FFF2-40B4-BE49-F238E27FC236}">
+                <a16:creationId xmlns:a16="http://schemas.microsoft.com/office/drawing/2014/main" id="{792CEC36-F866-41B5-AFB6-39D4B48B0A6C}"/>
+              </a:ext>
+            </a:extLst>
+          </p:cNvPr>
+          <p:cNvSpPr txBox="1"/>
+          <p:nvPr/>
+        </p:nvSpPr>
+        <p:spPr>
+          <a:xfrm>
+            <a:off x="359085" y="1288434"/>
+            <a:ext cx="5926306" cy="461665"/>
+          </a:xfrm>
+          <a:prstGeom prst="rect">
+            <a:avLst/>
+          </a:prstGeom>
+          <a:noFill/>
+        </p:spPr>
+        <p:txBody>
+          <a:bodyPr wrap="square" rtlCol="0">
+            <a:spAutoFit/>
+          </a:bodyPr>
+          <a:lstStyle>
+            <a:defPPr>
+              <a:defRPr lang="en-US"/>
+            </a:defPPr>
+            <a:lvl1pPr>
+              <a:defRPr sz="2400">
+                <a:solidFill>
+                  <a:schemeClr val="accent5">
+                    <a:lumMod val="75000"/>
+                  </a:schemeClr>
+                </a:solidFill>
+              </a:defRPr>
+            </a:lvl1pPr>
+          </a:lstStyle>
+          <a:p>
+            <a:r>
+              <a:rPr lang="en-US" dirty="0"/>
+              <a:t>Dependency parsing</a:t>
+            </a:r>
+          </a:p>
+        </p:txBody>
+      </p:sp>
+      <p:sp>
+        <p:nvSpPr>
+          <p:cNvPr id="12" name="TextBox 11">
+            <a:extLst>
+              <a:ext uri="{FF2B5EF4-FFF2-40B4-BE49-F238E27FC236}">
+                <a16:creationId xmlns:a16="http://schemas.microsoft.com/office/drawing/2014/main" id="{421D8A2C-304E-4EB9-A1B6-B88EB6E470DF}"/>
+              </a:ext>
+            </a:extLst>
+          </p:cNvPr>
+          <p:cNvSpPr txBox="1"/>
+          <p:nvPr/>
+        </p:nvSpPr>
+        <p:spPr>
+          <a:xfrm>
+            <a:off x="905522" y="1696347"/>
+            <a:ext cx="10431262" cy="2800767"/>
+          </a:xfrm>
+          <a:prstGeom prst="rect">
+            <a:avLst/>
+          </a:prstGeom>
+          <a:noFill/>
+        </p:spPr>
+        <p:txBody>
+          <a:bodyPr wrap="square" rtlCol="0">
+            <a:spAutoFit/>
+          </a:bodyPr>
+          <a:lstStyle/>
+          <a:p>
+            <a:r>
+              <a:rPr lang="en-US" sz="1600" dirty="0">
+                <a:latin typeface="Arial Nova" panose="020B0504020202020204" pitchFamily="34" charset="0"/>
+              </a:rPr>
+              <a:t>[('Is', 'AUX', 'Is', 'ROOT’), </a:t>
+            </a:r>
+          </a:p>
+          <a:p>
+            <a:r>
+              <a:rPr lang="en-US" sz="1600" dirty="0">
+                <a:latin typeface="Arial Nova" panose="020B0504020202020204" pitchFamily="34" charset="0"/>
+              </a:rPr>
+              <a:t>('there', 'PRON', 'Is', '</a:t>
+            </a:r>
+            <a:r>
+              <a:rPr lang="en-US" sz="1600" dirty="0" err="1">
+                <a:latin typeface="Arial Nova" panose="020B0504020202020204" pitchFamily="34" charset="0"/>
+              </a:rPr>
+              <a:t>expl</a:t>
+            </a:r>
+            <a:r>
+              <a:rPr lang="en-US" sz="1600" dirty="0">
+                <a:latin typeface="Arial Nova" panose="020B0504020202020204" pitchFamily="34" charset="0"/>
+              </a:rPr>
+              <a:t>’), </a:t>
+            </a:r>
+          </a:p>
+          <a:p>
+            <a:r>
+              <a:rPr lang="en-US" sz="1600" dirty="0">
+                <a:latin typeface="Arial Nova" panose="020B0504020202020204" pitchFamily="34" charset="0"/>
+              </a:rPr>
+              <a:t>('a', 'DET', 'requirement', 'det’), </a:t>
+            </a:r>
+          </a:p>
+          <a:p>
+            <a:r>
+              <a:rPr lang="en-US" sz="1600" dirty="0">
+                <a:latin typeface="Arial Nova" panose="020B0504020202020204" pitchFamily="34" charset="0"/>
+              </a:rPr>
+              <a:t>('height', 'NOUN', 'requirement', 'compound’), </a:t>
+            </a:r>
+          </a:p>
+          <a:p>
+            <a:r>
+              <a:rPr lang="en-US" sz="1600" dirty="0">
+                <a:latin typeface="Arial Nova" panose="020B0504020202020204" pitchFamily="34" charset="0"/>
+              </a:rPr>
+              <a:t>('requirement', 'NOUN', 'Is', '</a:t>
+            </a:r>
+            <a:r>
+              <a:rPr lang="en-US" sz="1600" dirty="0" err="1">
+                <a:latin typeface="Arial Nova" panose="020B0504020202020204" pitchFamily="34" charset="0"/>
+              </a:rPr>
+              <a:t>attr</a:t>
+            </a:r>
+            <a:r>
+              <a:rPr lang="en-US" sz="1600" dirty="0">
+                <a:latin typeface="Arial Nova" panose="020B0504020202020204" pitchFamily="34" charset="0"/>
+              </a:rPr>
+              <a:t>’), </a:t>
+            </a:r>
+          </a:p>
+          <a:p>
+            <a:r>
+              <a:rPr lang="en-US" sz="1600" dirty="0">
+                <a:latin typeface="Arial Nova" panose="020B0504020202020204" pitchFamily="34" charset="0"/>
+              </a:rPr>
+              <a:t>('for', 'ADP', 'requirement', 'prep’), </a:t>
+            </a:r>
+          </a:p>
+          <a:p>
+            <a:r>
+              <a:rPr lang="en-US" sz="1600" dirty="0">
+                <a:latin typeface="Arial Nova" panose="020B0504020202020204" pitchFamily="34" charset="0"/>
+              </a:rPr>
+              <a:t>('Star', 'PROPN', 'Wars', 'compound’), </a:t>
+            </a:r>
+          </a:p>
+          <a:p>
+            <a:r>
+              <a:rPr lang="en-US" sz="1600" dirty="0">
+                <a:latin typeface="Arial Nova" panose="020B0504020202020204" pitchFamily="34" charset="0"/>
+              </a:rPr>
+              <a:t>('Wars', 'PROPN', 'for', '</a:t>
+            </a:r>
+            <a:r>
+              <a:rPr lang="en-US" sz="1600" dirty="0" err="1">
+                <a:latin typeface="Arial Nova" panose="020B0504020202020204" pitchFamily="34" charset="0"/>
+              </a:rPr>
+              <a:t>pobj</a:t>
+            </a:r>
+            <a:r>
+              <a:rPr lang="en-US" sz="1600" dirty="0">
+                <a:latin typeface="Arial Nova" panose="020B0504020202020204" pitchFamily="34" charset="0"/>
+              </a:rPr>
+              <a:t>’), </a:t>
+            </a:r>
+          </a:p>
+          <a:p>
+            <a:r>
+              <a:rPr lang="en-US" sz="1600" dirty="0">
+                <a:latin typeface="Arial Nova" panose="020B0504020202020204" pitchFamily="34" charset="0"/>
+              </a:rPr>
+              <a:t>(':', 'PUNCT', 'requirement', '</a:t>
+            </a:r>
+            <a:r>
+              <a:rPr lang="en-US" sz="1600" dirty="0" err="1">
+                <a:latin typeface="Arial Nova" panose="020B0504020202020204" pitchFamily="34" charset="0"/>
+              </a:rPr>
+              <a:t>punct</a:t>
+            </a:r>
+            <a:r>
+              <a:rPr lang="en-US" sz="1600" dirty="0">
+                <a:latin typeface="Arial Nova" panose="020B0504020202020204" pitchFamily="34" charset="0"/>
+              </a:rPr>
+              <a:t>’), </a:t>
+            </a:r>
+          </a:p>
+          <a:p>
+            <a:r>
+              <a:rPr lang="en-US" sz="1600" dirty="0">
+                <a:latin typeface="Arial Nova" panose="020B0504020202020204" pitchFamily="34" charset="0"/>
+              </a:rPr>
+              <a:t>('Rise', 'NOUN', 'requirement', '</a:t>
+            </a:r>
+            <a:r>
+              <a:rPr lang="en-US" sz="1600" dirty="0" err="1">
+                <a:latin typeface="Arial Nova" panose="020B0504020202020204" pitchFamily="34" charset="0"/>
+              </a:rPr>
+              <a:t>appos</a:t>
+            </a:r>
+            <a:r>
+              <a:rPr lang="en-US" sz="1600" dirty="0">
+                <a:latin typeface="Arial Nova" panose="020B0504020202020204" pitchFamily="34" charset="0"/>
+              </a:rPr>
+              <a:t>'), ('of', 'ADP', 'Rise', 'prep'), ('the', 'DET', 'Resistance', 'det'), ('Resistance', 'PROPN', 'of', '</a:t>
+            </a:r>
+            <a:r>
+              <a:rPr lang="en-US" sz="1600" dirty="0" err="1">
+                <a:latin typeface="Arial Nova" panose="020B0504020202020204" pitchFamily="34" charset="0"/>
+              </a:rPr>
+              <a:t>pobj</a:t>
+            </a:r>
+            <a:r>
+              <a:rPr lang="en-US" sz="1600" dirty="0">
+                <a:latin typeface="Arial Nova" panose="020B0504020202020204" pitchFamily="34" charset="0"/>
+              </a:rPr>
+              <a:t>'), ('?', 'PUNCT', 'Is', '</a:t>
+            </a:r>
+            <a:r>
+              <a:rPr lang="en-US" sz="1600" dirty="0" err="1">
+                <a:latin typeface="Arial Nova" panose="020B0504020202020204" pitchFamily="34" charset="0"/>
+              </a:rPr>
+              <a:t>punct</a:t>
+            </a:r>
+            <a:r>
+              <a:rPr lang="en-US" sz="1600" dirty="0">
+                <a:latin typeface="Arial Nova" panose="020B0504020202020204" pitchFamily="34" charset="0"/>
+              </a:rPr>
+              <a:t>')] </a:t>
+            </a:r>
+          </a:p>
+        </p:txBody>
+      </p:sp>
+    </p:spTree>
+    <p:extLst>
+      <p:ext uri="{BB962C8B-B14F-4D97-AF65-F5344CB8AC3E}">
+        <p14:creationId xmlns:p14="http://schemas.microsoft.com/office/powerpoint/2010/main" val="298702021"/>
+      </p:ext>
+    </p:extLst>
+  </p:cSld>
+  <p:clrMapOvr>
+    <a:masterClrMapping/>
+  </p:clrMapOvr>
+  <p:timing>
+    <p:tnLst>
+      <p:par>
+        <p:cTn id="1" dur="indefinite" restart="never" nodeType="tmRoot">
+          <p:childTnLst>
+            <p:seq concurrent="1" nextAc="seek">
+              <p:cTn id="2" dur="indefinite" nodeType="mainSeq">
+                <p:childTnLst>
+                  <p:par>
+                    <p:cTn id="3" fill="hold">
+                      <p:stCondLst>
+                        <p:cond delay="indefinite"/>
+                        <p:cond evt="onBegin" delay="0">
+                          <p:tn val="2"/>
+                        </p:cond>
+                      </p:stCondLst>
+                      <p:childTnLst>
+                        <p:par>
+                          <p:cTn id="4" fill="hold">
+                            <p:stCondLst>
+                              <p:cond delay="0"/>
+                            </p:stCondLst>
+                            <p:childTnLst>
+                              <p:par>
+                                <p:cTn id="5" presetID="1" presetClass="entr" presetSubtype="0" fill="hold" grpId="0" nodeType="withEffect">
+                                  <p:stCondLst>
+                                    <p:cond delay="0"/>
+                                  </p:stCondLst>
+                                  <p:childTnLst>
+                                    <p:set>
+                                      <p:cBhvr>
+                                        <p:cTn id="6" dur="1" fill="hold">
+                                          <p:stCondLst>
+                                            <p:cond delay="0"/>
+                                          </p:stCondLst>
+                                        </p:cTn>
+                                        <p:tgtEl>
+                                          <p:spTgt spid="7"/>
+                                        </p:tgtEl>
+                                        <p:attrNameLst>
+                                          <p:attrName>style.visibility</p:attrName>
+                                        </p:attrNameLst>
+                                      </p:cBhvr>
+                                      <p:to>
+                                        <p:strVal val="visible"/>
+                                      </p:to>
+                                    </p:set>
+                                  </p:childTnLst>
+                                </p:cTn>
+                              </p:par>
+                            </p:childTnLst>
+                          </p:cTn>
+                        </p:par>
+                      </p:childTnLst>
+                    </p:cTn>
+                  </p:par>
+                </p:childTnLst>
+              </p:cTn>
+              <p:prevCondLst>
+                <p:cond evt="onPrev" delay="0">
+                  <p:tgtEl>
+                    <p:sldTgt/>
+                  </p:tgtEl>
+                </p:cond>
+              </p:prevCondLst>
+              <p:nextCondLst>
+                <p:cond evt="onNext" delay="0">
+                  <p:tgtEl>
+                    <p:sldTgt/>
+                  </p:tgtEl>
+                </p:cond>
+              </p:nextCondLst>
+            </p:seq>
+          </p:childTnLst>
+        </p:cTn>
+      </p:par>
+    </p:tnLst>
+    <p:bldLst>
+      <p:bldP spid="7" grpId="0"/>
+    </p:bldLst>
+  </p:timing>
+</p:sld>
+</file>
+
+<file path=ppt/slides/slide6.xml><?xml version="1.0" encoding="utf-8"?>
+<p:sld xmlns:a="http://schemas.openxmlformats.org/drawingml/2006/main" xmlns:r="http://schemas.openxmlformats.org/officeDocument/2006/relationships" xmlns:p="http://schemas.openxmlformats.org/presentationml/2006/main">
+  <p:cSld>
+    <p:spTree>
+      <p:nvGrpSpPr>
+        <p:cNvPr id="1" name=""/>
+        <p:cNvGrpSpPr/>
+        <p:nvPr/>
+      </p:nvGrpSpPr>
+      <p:grpSpPr>
+        <a:xfrm>
+          <a:off x="0" y="0"/>
+          <a:ext cx="0" cy="0"/>
+          <a:chOff x="0" y="0"/>
+          <a:chExt cx="0" cy="0"/>
+        </a:xfrm>
+      </p:grpSpPr>
+      <p:sp>
+        <p:nvSpPr>
+          <p:cNvPr id="13" name="Title 1">
+            <a:extLst>
+              <a:ext uri="{FF2B5EF4-FFF2-40B4-BE49-F238E27FC236}">
+                <a16:creationId xmlns:a16="http://schemas.microsoft.com/office/drawing/2014/main" id="{1127F941-043E-4D99-BA77-D0CB0DAFE611}"/>
+              </a:ext>
+            </a:extLst>
+          </p:cNvPr>
+          <p:cNvSpPr txBox="1">
+            <a:spLocks/>
+          </p:cNvSpPr>
+          <p:nvPr/>
+        </p:nvSpPr>
+        <p:spPr>
+          <a:xfrm>
+            <a:off x="0" y="1"/>
+            <a:ext cx="12192000" cy="1141581"/>
+          </a:xfrm>
+          <a:prstGeom prst="rect">
+            <a:avLst/>
+          </a:prstGeom>
+          <a:solidFill>
+            <a:schemeClr val="tx2">
+              <a:lumMod val="75000"/>
+            </a:schemeClr>
+          </a:solidFill>
+        </p:spPr>
+        <p:txBody>
+          <a:bodyPr vert="horz" lIns="91440" tIns="45720" rIns="91440" bIns="45720" rtlCol="0" anchor="ctr">
+            <a:normAutofit/>
+          </a:bodyPr>
+          <a:lstStyle>
+            <a:lvl1pPr algn="l" defTabSz="914400" rtl="0" eaLnBrk="1" latinLnBrk="0" hangingPunct="1">
+              <a:lnSpc>
+                <a:spcPct val="90000"/>
+              </a:lnSpc>
+              <a:spcBef>
+                <a:spcPct val="0"/>
+              </a:spcBef>
+              <a:buNone/>
+              <a:defRPr sz="4400" kern="1200">
+                <a:solidFill>
+                  <a:schemeClr val="tx1"/>
+                </a:solidFill>
+                <a:latin typeface="+mj-lt"/>
+                <a:ea typeface="+mj-ea"/>
+                <a:cs typeface="+mj-cs"/>
+              </a:defRPr>
+            </a:lvl1pPr>
+          </a:lstStyle>
+          <a:p>
+            <a:r>
+              <a:rPr lang="en-US" sz="5700" dirty="0">
+                <a:solidFill>
+                  <a:schemeClr val="bg1"/>
+                </a:solidFill>
+              </a:rPr>
+              <a:t>   Question Processing</a:t>
+            </a:r>
+          </a:p>
+        </p:txBody>
+      </p:sp>
+      <p:pic>
+        <p:nvPicPr>
+          <p:cNvPr id="20" name="Picture 19">
+            <a:extLst>
+              <a:ext uri="{FF2B5EF4-FFF2-40B4-BE49-F238E27FC236}">
+                <a16:creationId xmlns:a16="http://schemas.microsoft.com/office/drawing/2014/main" id="{B5D47350-D5C7-4323-951F-3AE1A43766EE}"/>
+              </a:ext>
+            </a:extLst>
+          </p:cNvPr>
+          <p:cNvPicPr>
+            <a:picLocks noChangeAspect="1"/>
+          </p:cNvPicPr>
+          <p:nvPr/>
+        </p:nvPicPr>
+        <p:blipFill>
+          <a:blip r:embed="rId2"/>
+          <a:stretch>
+            <a:fillRect/>
+          </a:stretch>
+        </p:blipFill>
+        <p:spPr>
+          <a:xfrm>
+            <a:off x="8134350" y="693019"/>
+            <a:ext cx="4057650" cy="447675"/>
+          </a:xfrm>
+          <a:prstGeom prst="rect">
+            <a:avLst/>
+          </a:prstGeom>
+        </p:spPr>
+      </p:pic>
+      <p:sp>
+        <p:nvSpPr>
+          <p:cNvPr id="9" name="TextBox 8">
+            <a:extLst>
+              <a:ext uri="{FF2B5EF4-FFF2-40B4-BE49-F238E27FC236}">
+                <a16:creationId xmlns:a16="http://schemas.microsoft.com/office/drawing/2014/main" id="{C89228A3-622A-4772-9DB4-18944F5F5058}"/>
+              </a:ext>
+            </a:extLst>
+          </p:cNvPr>
+          <p:cNvSpPr txBox="1"/>
+          <p:nvPr/>
+        </p:nvSpPr>
+        <p:spPr>
+          <a:xfrm>
+            <a:off x="612561" y="2589665"/>
+            <a:ext cx="5926306" cy="461665"/>
+          </a:xfrm>
+          <a:prstGeom prst="rect">
+            <a:avLst/>
+          </a:prstGeom>
+          <a:noFill/>
+        </p:spPr>
+        <p:txBody>
+          <a:bodyPr wrap="square" rtlCol="0">
+            <a:spAutoFit/>
+          </a:bodyPr>
+          <a:lstStyle>
+            <a:defPPr>
+              <a:defRPr lang="en-US"/>
+            </a:defPPr>
+            <a:lvl1pPr>
+              <a:defRPr sz="2400">
+                <a:solidFill>
+                  <a:schemeClr val="accent5">
+                    <a:lumMod val="75000"/>
+                  </a:schemeClr>
+                </a:solidFill>
+              </a:defRPr>
+            </a:lvl1pPr>
+          </a:lstStyle>
+          <a:p>
+            <a:r>
+              <a:rPr lang="en-US" dirty="0"/>
+              <a:t>Key words</a:t>
+            </a:r>
+          </a:p>
+        </p:txBody>
+      </p:sp>
+      <p:sp>
+        <p:nvSpPr>
+          <p:cNvPr id="10" name="TextBox 9">
+            <a:extLst>
+              <a:ext uri="{FF2B5EF4-FFF2-40B4-BE49-F238E27FC236}">
+                <a16:creationId xmlns:a16="http://schemas.microsoft.com/office/drawing/2014/main" id="{3C765B04-BCC0-48F3-BD1F-558F7D42D8D0}"/>
+              </a:ext>
+            </a:extLst>
+          </p:cNvPr>
+          <p:cNvSpPr txBox="1"/>
+          <p:nvPr/>
+        </p:nvSpPr>
+        <p:spPr>
+          <a:xfrm>
+            <a:off x="612561" y="1509290"/>
+            <a:ext cx="5926306" cy="461665"/>
+          </a:xfrm>
+          <a:prstGeom prst="rect">
+            <a:avLst/>
+          </a:prstGeom>
+          <a:noFill/>
+        </p:spPr>
+        <p:txBody>
+          <a:bodyPr wrap="square" rtlCol="0">
+            <a:spAutoFit/>
+          </a:bodyPr>
+          <a:lstStyle>
+            <a:defPPr>
+              <a:defRPr lang="en-US"/>
+            </a:defPPr>
+            <a:lvl1pPr>
+              <a:defRPr sz="2400">
+                <a:solidFill>
+                  <a:schemeClr val="accent5">
+                    <a:lumMod val="75000"/>
+                  </a:schemeClr>
+                </a:solidFill>
+              </a:defRPr>
+            </a:lvl1pPr>
+          </a:lstStyle>
+          <a:p>
+            <a:r>
+              <a:rPr lang="en-US" dirty="0"/>
+              <a:t>Head words</a:t>
+            </a:r>
+          </a:p>
+        </p:txBody>
+      </p:sp>
+      <p:sp>
+        <p:nvSpPr>
+          <p:cNvPr id="11" name="TextBox 10">
+            <a:extLst>
+              <a:ext uri="{FF2B5EF4-FFF2-40B4-BE49-F238E27FC236}">
+                <a16:creationId xmlns:a16="http://schemas.microsoft.com/office/drawing/2014/main" id="{C1158A1D-D22B-4DCF-9AFD-3BDF600E8984}"/>
+              </a:ext>
+            </a:extLst>
+          </p:cNvPr>
+          <p:cNvSpPr txBox="1"/>
+          <p:nvPr/>
+        </p:nvSpPr>
+        <p:spPr>
+          <a:xfrm>
+            <a:off x="612561" y="3807172"/>
+            <a:ext cx="2601156" cy="461665"/>
+          </a:xfrm>
+          <a:prstGeom prst="rect">
+            <a:avLst/>
+          </a:prstGeom>
+          <a:noFill/>
+        </p:spPr>
+        <p:txBody>
+          <a:bodyPr wrap="square" rtlCol="0">
+            <a:spAutoFit/>
+          </a:bodyPr>
+          <a:lstStyle>
+            <a:defPPr>
+              <a:defRPr lang="en-US"/>
+            </a:defPPr>
+            <a:lvl1pPr>
+              <a:defRPr sz="2400">
+                <a:solidFill>
+                  <a:schemeClr val="accent5">
+                    <a:lumMod val="75000"/>
+                  </a:schemeClr>
+                </a:solidFill>
+              </a:defRPr>
+            </a:lvl1pPr>
+          </a:lstStyle>
+          <a:p>
+            <a:r>
+              <a:rPr lang="en-US" dirty="0"/>
+              <a:t>Answer type</a:t>
+            </a:r>
+          </a:p>
+        </p:txBody>
+      </p:sp>
+      <p:sp>
+        <p:nvSpPr>
+          <p:cNvPr id="12" name="TextBox 11">
+            <a:extLst>
+              <a:ext uri="{FF2B5EF4-FFF2-40B4-BE49-F238E27FC236}">
+                <a16:creationId xmlns:a16="http://schemas.microsoft.com/office/drawing/2014/main" id="{421D8A2C-304E-4EB9-A1B6-B88EB6E470DF}"/>
+              </a:ext>
+            </a:extLst>
+          </p:cNvPr>
+          <p:cNvSpPr txBox="1"/>
+          <p:nvPr/>
+        </p:nvSpPr>
+        <p:spPr>
+          <a:xfrm>
+            <a:off x="942513" y="4281133"/>
+            <a:ext cx="10431262" cy="338554"/>
+          </a:xfrm>
+          <a:prstGeom prst="rect">
+            <a:avLst/>
+          </a:prstGeom>
+          <a:noFill/>
+        </p:spPr>
+        <p:txBody>
+          <a:bodyPr wrap="square" rtlCol="0">
+            <a:spAutoFit/>
+          </a:bodyPr>
+          <a:lstStyle/>
+          <a:p>
+            <a:r>
+              <a:rPr lang="en-US" sz="1600" dirty="0">
+                <a:latin typeface="Arial Nova" panose="020B0504020202020204" pitchFamily="34" charset="0"/>
+              </a:rPr>
+              <a:t>', 'Is', '</a:t>
+            </a:r>
+            <a:r>
+              <a:rPr lang="en-US" sz="1600" dirty="0" err="1">
+                <a:latin typeface="Arial Nova" panose="020B0504020202020204" pitchFamily="34" charset="0"/>
+              </a:rPr>
+              <a:t>punct</a:t>
+            </a:r>
+            <a:r>
+              <a:rPr lang="en-US" sz="1600" dirty="0">
+                <a:latin typeface="Arial Nova" panose="020B0504020202020204" pitchFamily="34" charset="0"/>
+              </a:rPr>
+              <a:t>')] </a:t>
+            </a:r>
+          </a:p>
+        </p:txBody>
+      </p:sp>
+      <p:sp>
+        <p:nvSpPr>
+          <p:cNvPr id="14" name="TextBox 13">
+            <a:extLst>
+              <a:ext uri="{FF2B5EF4-FFF2-40B4-BE49-F238E27FC236}">
+                <a16:creationId xmlns:a16="http://schemas.microsoft.com/office/drawing/2014/main" id="{86B4FD8D-8EAF-462D-83B7-6EF061B78299}"/>
+              </a:ext>
+            </a:extLst>
+          </p:cNvPr>
+          <p:cNvSpPr txBox="1"/>
+          <p:nvPr/>
+        </p:nvSpPr>
+        <p:spPr>
+          <a:xfrm>
+            <a:off x="942513" y="3186737"/>
+            <a:ext cx="10431262" cy="338554"/>
+          </a:xfrm>
+          <a:prstGeom prst="rect">
+            <a:avLst/>
+          </a:prstGeom>
+          <a:noFill/>
+        </p:spPr>
+        <p:txBody>
+          <a:bodyPr wrap="square" rtlCol="0">
+            <a:spAutoFit/>
+          </a:bodyPr>
+          <a:lstStyle/>
+          <a:p>
+            <a:r>
+              <a:rPr lang="en-US" sz="1600" dirty="0">
+                <a:latin typeface="Arial Nova" panose="020B0504020202020204" pitchFamily="34" charset="0"/>
+              </a:rPr>
+              <a:t>', 'Is', '</a:t>
+            </a:r>
+            <a:r>
+              <a:rPr lang="en-US" sz="1600" dirty="0" err="1">
+                <a:latin typeface="Arial Nova" panose="020B0504020202020204" pitchFamily="34" charset="0"/>
+              </a:rPr>
+              <a:t>punct</a:t>
+            </a:r>
+            <a:r>
+              <a:rPr lang="en-US" sz="1600" dirty="0">
+                <a:latin typeface="Arial Nova" panose="020B0504020202020204" pitchFamily="34" charset="0"/>
+              </a:rPr>
+              <a:t>')] </a:t>
+            </a:r>
+          </a:p>
+        </p:txBody>
+      </p:sp>
+      <p:sp>
+        <p:nvSpPr>
+          <p:cNvPr id="15" name="TextBox 14">
+            <a:extLst>
+              <a:ext uri="{FF2B5EF4-FFF2-40B4-BE49-F238E27FC236}">
+                <a16:creationId xmlns:a16="http://schemas.microsoft.com/office/drawing/2014/main" id="{B7C35872-74FF-4556-BC7A-FD1A42B4B096}"/>
+              </a:ext>
+            </a:extLst>
+          </p:cNvPr>
+          <p:cNvSpPr txBox="1"/>
+          <p:nvPr/>
+        </p:nvSpPr>
+        <p:spPr>
+          <a:xfrm>
+            <a:off x="942513" y="2037120"/>
+            <a:ext cx="10431262" cy="338554"/>
+          </a:xfrm>
+          <a:prstGeom prst="rect">
+            <a:avLst/>
+          </a:prstGeom>
+          <a:noFill/>
+        </p:spPr>
+        <p:txBody>
+          <a:bodyPr wrap="square" rtlCol="0">
+            <a:spAutoFit/>
+          </a:bodyPr>
+          <a:lstStyle/>
+          <a:p>
+            <a:r>
+              <a:rPr lang="en-US" sz="1600" dirty="0">
+                <a:latin typeface="Arial Nova" panose="020B0504020202020204" pitchFamily="34" charset="0"/>
+              </a:rPr>
+              <a:t>', 'Is', '</a:t>
+            </a:r>
+            <a:r>
+              <a:rPr lang="en-US" sz="1600" dirty="0" err="1">
+                <a:latin typeface="Arial Nova" panose="020B0504020202020204" pitchFamily="34" charset="0"/>
+              </a:rPr>
+              <a:t>punct</a:t>
+            </a:r>
+            <a:r>
+              <a:rPr lang="en-US" sz="1600" dirty="0">
+                <a:latin typeface="Arial Nova" panose="020B0504020202020204" pitchFamily="34" charset="0"/>
+              </a:rPr>
+              <a:t>')] </a:t>
+            </a:r>
+          </a:p>
+        </p:txBody>
+      </p:sp>
+    </p:spTree>
+    <p:extLst>
+      <p:ext uri="{BB962C8B-B14F-4D97-AF65-F5344CB8AC3E}">
+        <p14:creationId xmlns:p14="http://schemas.microsoft.com/office/powerpoint/2010/main" val="490681282"/>
+      </p:ext>
+    </p:extLst>
+  </p:cSld>
+  <p:clrMapOvr>
+    <a:masterClrMapping/>
+  </p:clrMapOvr>
+  <p:timing>
+    <p:tnLst>
+      <p:par>
+        <p:cTn id="1" dur="indefinite" restart="never" nodeType="tmRoot">
+          <p:childTnLst>
+            <p:seq concurrent="1" nextAc="seek">
+              <p:cTn id="2" dur="indefinite" nodeType="mainSeq">
+                <p:childTnLst>
+                  <p:par>
+                    <p:cTn id="3" fill="hold">
+                      <p:stCondLst>
+                        <p:cond delay="indefinite"/>
+                        <p:cond evt="onBegin" delay="0">
+                          <p:tn val="2"/>
+                        </p:cond>
+                      </p:stCondLst>
+                      <p:childTnLst>
+                        <p:par>
+                          <p:cTn id="4" fill="hold">
+                            <p:stCondLst>
+                              <p:cond delay="0"/>
+                            </p:stCondLst>
+                            <p:childTnLst>
+                              <p:par>
+                                <p:cTn id="5" presetID="1" presetClass="entr" presetSubtype="0" fill="hold" grpId="0" nodeType="withEffect">
+                                  <p:stCondLst>
+                                    <p:cond delay="0"/>
+                                  </p:stCondLst>
+                                  <p:childTnLst>
+                                    <p:set>
+                                      <p:cBhvr>
+                                        <p:cTn id="6" dur="1" fill="hold">
+                                          <p:stCondLst>
+                                            <p:cond delay="0"/>
+                                          </p:stCondLst>
+                                        </p:cTn>
+                                        <p:tgtEl>
+                                          <p:spTgt spid="9"/>
+                                        </p:tgtEl>
+                                        <p:attrNameLst>
+                                          <p:attrName>style.visibility</p:attrName>
+                                        </p:attrNameLst>
+                                      </p:cBhvr>
+                                      <p:to>
+                                        <p:strVal val="visible"/>
+                                      </p:to>
+                                    </p:set>
+                                  </p:childTnLst>
+                                </p:cTn>
+                              </p:par>
+                              <p:par>
+                                <p:cTn id="7" presetID="1" presetClass="entr" presetSubtype="0" fill="hold" grpId="0" nodeType="withEffect">
+                                  <p:stCondLst>
+                                    <p:cond delay="0"/>
+                                  </p:stCondLst>
+                                  <p:childTnLst>
+                                    <p:set>
+                                      <p:cBhvr>
+                                        <p:cTn id="8" dur="1" fill="hold">
+                                          <p:stCondLst>
+                                            <p:cond delay="0"/>
+                                          </p:stCondLst>
+                                        </p:cTn>
+                                        <p:tgtEl>
+                                          <p:spTgt spid="10"/>
+                                        </p:tgtEl>
+                                        <p:attrNameLst>
+                                          <p:attrName>style.visibility</p:attrName>
+                                        </p:attrNameLst>
+                                      </p:cBhvr>
+                                      <p:to>
+                                        <p:strVal val="visible"/>
+                                      </p:to>
+                                    </p:set>
+                                  </p:childTnLst>
+                                </p:cTn>
+                              </p:par>
+                              <p:par>
+                                <p:cTn id="9" presetID="1" presetClass="entr" presetSubtype="0" fill="hold" grpId="0" nodeType="withEffect">
+                                  <p:stCondLst>
+                                    <p:cond delay="0"/>
+                                  </p:stCondLst>
+                                  <p:childTnLst>
+                                    <p:set>
+                                      <p:cBhvr>
+                                        <p:cTn id="10" dur="1" fill="hold">
+                                          <p:stCondLst>
+                                            <p:cond delay="0"/>
+                                          </p:stCondLst>
+                                        </p:cTn>
+                                        <p:tgtEl>
+                                          <p:spTgt spid="11"/>
+                                        </p:tgtEl>
+                                        <p:attrNameLst>
+                                          <p:attrName>style.visibility</p:attrName>
+                                        </p:attrNameLst>
+                                      </p:cBhvr>
+                                      <p:to>
+                                        <p:strVal val="visible"/>
+                                      </p:to>
+                                    </p:set>
+                                  </p:childTnLst>
+                                </p:cTn>
+                              </p:par>
+                            </p:childTnLst>
+                          </p:cTn>
+                        </p:par>
+                      </p:childTnLst>
+                    </p:cTn>
+                  </p:par>
+                </p:childTnLst>
+              </p:cTn>
+              <p:prevCondLst>
+                <p:cond evt="onPrev" delay="0">
+                  <p:tgtEl>
+                    <p:sldTgt/>
+                  </p:tgtEl>
+                </p:cond>
+              </p:prevCondLst>
+              <p:nextCondLst>
+                <p:cond evt="onNext" delay="0">
+                  <p:tgtEl>
+                    <p:sldTgt/>
+                  </p:tgtEl>
+                </p:cond>
+              </p:nextCondLst>
+            </p:seq>
+          </p:childTnLst>
+        </p:cTn>
+      </p:par>
+    </p:tnLst>
+    <p:bldLst>
+      <p:bldP spid="9" grpId="0"/>
+      <p:bldP spid="10" grpId="0"/>
+      <p:bldP spid="11" grpId="0"/>
+    </p:bldLst>
+  </p:timing>
+</p:sld>
+</file>
+
+<file path=ppt/slides/slide7.xml><?xml version="1.0" encoding="utf-8"?>
 <p:sld xmlns:a="http://schemas.openxmlformats.org/drawingml/2006/main" xmlns:r="http://schemas.openxmlformats.org/officeDocument/2006/relationships" xmlns:p="http://schemas.openxmlformats.org/presentationml/2006/main">
   <p:cSld>
     <p:spTree>
@@ -6624,7 +7973,7 @@
 </p:sld>
 </file>
 
-<file path=ppt/slides/slide6.xml><?xml version="1.0" encoding="utf-8"?>
+<file path=ppt/slides/slide8.xml><?xml version="1.0" encoding="utf-8"?>
 <p:sld xmlns:a="http://schemas.openxmlformats.org/drawingml/2006/main" xmlns:r="http://schemas.openxmlformats.org/officeDocument/2006/relationships" xmlns:p="http://schemas.openxmlformats.org/presentationml/2006/main">
   <p:cSld>
     <p:spTree>

</xml_diff>